<commit_message>
yoo the readme messed up
</commit_message>
<xml_diff>
--- a/prototypes.pptx
+++ b/prototypes.pptx
@@ -10,6 +10,7 @@
     <p:sldId id="259" r:id="rId4"/>
     <p:sldId id="260" r:id="rId5"/>
     <p:sldId id="261" r:id="rId6"/>
+    <p:sldId id="262" r:id="rId7"/>
   </p:sldIdLst>
   <p:sldSz cx="12192000" cy="6858000"/>
   <p:notesSz cx="6858000" cy="9144000"/>
@@ -5075,6 +5076,745 @@
 </p:sld>
 </file>
 
+<file path=ppt/slides/slide6.xml><?xml version="1.0" encoding="utf-8"?>
+<p:sld xmlns:a="http://schemas.openxmlformats.org/drawingml/2006/main" xmlns:r="http://schemas.openxmlformats.org/officeDocument/2006/relationships" xmlns:p="http://schemas.openxmlformats.org/presentationml/2006/main">
+  <p:cSld>
+    <p:spTree>
+      <p:nvGrpSpPr>
+        <p:cNvPr id="1" name=""/>
+        <p:cNvGrpSpPr/>
+        <p:nvPr/>
+      </p:nvGrpSpPr>
+      <p:grpSpPr>
+        <a:xfrm>
+          <a:off x="0" y="0"/>
+          <a:ext cx="0" cy="0"/>
+          <a:chOff x="0" y="0"/>
+          <a:chExt cx="0" cy="0"/>
+        </a:xfrm>
+      </p:grpSpPr>
+      <p:sp>
+        <p:nvSpPr>
+          <p:cNvPr id="5" name="TextBox 4">
+            <a:extLst>
+              <a:ext uri="{FF2B5EF4-FFF2-40B4-BE49-F238E27FC236}">
+                <a16:creationId xmlns:a16="http://schemas.microsoft.com/office/drawing/2014/main" id="{507E23E4-AF16-8B36-CC72-EAAC4CC8B3C4}"/>
+              </a:ext>
+            </a:extLst>
+          </p:cNvPr>
+          <p:cNvSpPr txBox="1"/>
+          <p:nvPr/>
+        </p:nvSpPr>
+        <p:spPr>
+          <a:xfrm>
+            <a:off x="0" y="6488668"/>
+            <a:ext cx="797782" cy="369332"/>
+          </a:xfrm>
+          <a:prstGeom prst="rect">
+            <a:avLst/>
+          </a:prstGeom>
+          <a:noFill/>
+        </p:spPr>
+        <p:txBody>
+          <a:bodyPr wrap="none" rtlCol="0">
+            <a:spAutoFit/>
+          </a:bodyPr>
+          <a:lstStyle/>
+          <a:p>
+            <a:r>
+              <a:rPr lang="en-US">
+                <a:solidFill>
+                  <a:schemeClr val="bg1">
+                    <a:lumMod val="50000"/>
+                  </a:schemeClr>
+                </a:solidFill>
+              </a:rPr>
+              <a:t>Type 6</a:t>
+            </a:r>
+            <a:endParaRPr lang="en-PH" dirty="0">
+              <a:solidFill>
+                <a:schemeClr val="bg1">
+                  <a:lumMod val="50000"/>
+                </a:schemeClr>
+              </a:solidFill>
+            </a:endParaRPr>
+          </a:p>
+        </p:txBody>
+      </p:sp>
+      <p:grpSp>
+        <p:nvGrpSpPr>
+          <p:cNvPr id="14" name="Group 13">
+            <a:extLst>
+              <a:ext uri="{FF2B5EF4-FFF2-40B4-BE49-F238E27FC236}">
+                <a16:creationId xmlns:a16="http://schemas.microsoft.com/office/drawing/2014/main" id="{74EED465-5107-73B0-DEA6-C06663E9FBC6}"/>
+              </a:ext>
+            </a:extLst>
+          </p:cNvPr>
+          <p:cNvGrpSpPr/>
+          <p:nvPr/>
+        </p:nvGrpSpPr>
+        <p:grpSpPr>
+          <a:xfrm>
+            <a:off x="2397512" y="1739592"/>
+            <a:ext cx="7396975" cy="3055386"/>
+            <a:chOff x="2397512" y="1739592"/>
+            <a:chExt cx="7396975" cy="3055386"/>
+          </a:xfrm>
+        </p:grpSpPr>
+        <p:sp>
+          <p:nvSpPr>
+            <p:cNvPr id="2" name="Rectangle 1">
+              <a:extLst>
+                <a:ext uri="{FF2B5EF4-FFF2-40B4-BE49-F238E27FC236}">
+                  <a16:creationId xmlns:a16="http://schemas.microsoft.com/office/drawing/2014/main" id="{928F0843-1E89-F1C3-DE80-156539E36E22}"/>
+                </a:ext>
+              </a:extLst>
+            </p:cNvPr>
+            <p:cNvSpPr/>
+            <p:nvPr/>
+          </p:nvSpPr>
+          <p:spPr>
+            <a:xfrm>
+              <a:off x="2397512" y="1739592"/>
+              <a:ext cx="7396975" cy="457199"/>
+            </a:xfrm>
+            <a:prstGeom prst="rect">
+              <a:avLst/>
+            </a:prstGeom>
+            <a:noFill/>
+            <a:ln>
+              <a:solidFill>
+                <a:schemeClr val="tx1"/>
+              </a:solidFill>
+            </a:ln>
+          </p:spPr>
+          <p:style>
+            <a:lnRef idx="2">
+              <a:schemeClr val="accent1">
+                <a:shade val="50000"/>
+              </a:schemeClr>
+            </a:lnRef>
+            <a:fillRef idx="1">
+              <a:schemeClr val="accent1"/>
+            </a:fillRef>
+            <a:effectRef idx="0">
+              <a:schemeClr val="accent1"/>
+            </a:effectRef>
+            <a:fontRef idx="minor">
+              <a:schemeClr val="lt1"/>
+            </a:fontRef>
+          </p:style>
+          <p:txBody>
+            <a:bodyPr rtlCol="0" anchor="ctr"/>
+            <a:lstStyle/>
+            <a:p>
+              <a:pPr algn="ctr"/>
+              <a:r>
+                <a:rPr lang="en-US" dirty="0">
+                  <a:solidFill>
+                    <a:schemeClr val="tx1"/>
+                  </a:solidFill>
+                </a:rPr>
+                <a:t>Description Title</a:t>
+              </a:r>
+              <a:endParaRPr lang="en-PH" dirty="0">
+                <a:solidFill>
+                  <a:schemeClr val="tx1"/>
+                </a:solidFill>
+              </a:endParaRPr>
+            </a:p>
+          </p:txBody>
+        </p:sp>
+        <p:sp>
+          <p:nvSpPr>
+            <p:cNvPr id="3" name="Rectangle 2">
+              <a:extLst>
+                <a:ext uri="{FF2B5EF4-FFF2-40B4-BE49-F238E27FC236}">
+                  <a16:creationId xmlns:a16="http://schemas.microsoft.com/office/drawing/2014/main" id="{205E017C-E00D-F5A0-AA96-5976DDC5C0E0}"/>
+                </a:ext>
+              </a:extLst>
+            </p:cNvPr>
+            <p:cNvSpPr/>
+            <p:nvPr/>
+          </p:nvSpPr>
+          <p:spPr>
+            <a:xfrm>
+              <a:off x="2397512" y="2382641"/>
+              <a:ext cx="7396975" cy="457199"/>
+            </a:xfrm>
+            <a:prstGeom prst="rect">
+              <a:avLst/>
+            </a:prstGeom>
+            <a:noFill/>
+            <a:ln>
+              <a:solidFill>
+                <a:schemeClr val="tx1"/>
+              </a:solidFill>
+            </a:ln>
+          </p:spPr>
+          <p:style>
+            <a:lnRef idx="2">
+              <a:schemeClr val="accent1">
+                <a:shade val="50000"/>
+              </a:schemeClr>
+            </a:lnRef>
+            <a:fillRef idx="1">
+              <a:schemeClr val="accent1"/>
+            </a:fillRef>
+            <a:effectRef idx="0">
+              <a:schemeClr val="accent1"/>
+            </a:effectRef>
+            <a:fontRef idx="minor">
+              <a:schemeClr val="lt1"/>
+            </a:fontRef>
+          </p:style>
+          <p:txBody>
+            <a:bodyPr rtlCol="0" anchor="ctr"/>
+            <a:lstStyle/>
+            <a:p>
+              <a:pPr algn="ctr"/>
+              <a:r>
+                <a:rPr lang="en-US" dirty="0">
+                  <a:solidFill>
+                    <a:schemeClr val="tx1"/>
+                  </a:solidFill>
+                </a:rPr>
+                <a:t>Description</a:t>
+              </a:r>
+              <a:endParaRPr lang="en-PH" dirty="0">
+                <a:solidFill>
+                  <a:schemeClr val="tx1"/>
+                </a:solidFill>
+              </a:endParaRPr>
+            </a:p>
+          </p:txBody>
+        </p:sp>
+        <p:sp>
+          <p:nvSpPr>
+            <p:cNvPr id="6" name="Rectangle: Rounded Corners 5">
+              <a:extLst>
+                <a:ext uri="{FF2B5EF4-FFF2-40B4-BE49-F238E27FC236}">
+                  <a16:creationId xmlns:a16="http://schemas.microsoft.com/office/drawing/2014/main" id="{390567E5-339A-0BE8-34BB-DA4129F0889B}"/>
+                </a:ext>
+              </a:extLst>
+            </p:cNvPr>
+            <p:cNvSpPr/>
+            <p:nvPr/>
+          </p:nvSpPr>
+          <p:spPr>
+            <a:xfrm>
+              <a:off x="5544013" y="3025689"/>
+              <a:ext cx="1103971" cy="457199"/>
+            </a:xfrm>
+            <a:prstGeom prst="roundRect">
+              <a:avLst/>
+            </a:prstGeom>
+            <a:noFill/>
+            <a:ln>
+              <a:solidFill>
+                <a:schemeClr val="tx1"/>
+              </a:solidFill>
+            </a:ln>
+          </p:spPr>
+          <p:style>
+            <a:lnRef idx="2">
+              <a:schemeClr val="accent1">
+                <a:shade val="50000"/>
+              </a:schemeClr>
+            </a:lnRef>
+            <a:fillRef idx="1">
+              <a:schemeClr val="accent1"/>
+            </a:fillRef>
+            <a:effectRef idx="0">
+              <a:schemeClr val="accent1"/>
+            </a:effectRef>
+            <a:fontRef idx="minor">
+              <a:schemeClr val="lt1"/>
+            </a:fontRef>
+          </p:style>
+          <p:txBody>
+            <a:bodyPr rtlCol="0" anchor="ctr"/>
+            <a:lstStyle/>
+            <a:p>
+              <a:pPr algn="ctr"/>
+              <a:r>
+                <a:rPr lang="en-US" dirty="0">
+                  <a:solidFill>
+                    <a:schemeClr val="tx1"/>
+                  </a:solidFill>
+                </a:rPr>
+                <a:t>Item</a:t>
+              </a:r>
+              <a:endParaRPr lang="en-PH" dirty="0">
+                <a:solidFill>
+                  <a:schemeClr val="tx1"/>
+                </a:solidFill>
+              </a:endParaRPr>
+            </a:p>
+          </p:txBody>
+        </p:sp>
+        <p:sp>
+          <p:nvSpPr>
+            <p:cNvPr id="7" name="Rectangle: Rounded Corners 6">
+              <a:extLst>
+                <a:ext uri="{FF2B5EF4-FFF2-40B4-BE49-F238E27FC236}">
+                  <a16:creationId xmlns:a16="http://schemas.microsoft.com/office/drawing/2014/main" id="{BD3DF30E-3621-75D1-E156-3AB540002325}"/>
+                </a:ext>
+              </a:extLst>
+            </p:cNvPr>
+            <p:cNvSpPr/>
+            <p:nvPr/>
+          </p:nvSpPr>
+          <p:spPr>
+            <a:xfrm>
+              <a:off x="6889593" y="3025689"/>
+              <a:ext cx="1103971" cy="457199"/>
+            </a:xfrm>
+            <a:prstGeom prst="roundRect">
+              <a:avLst/>
+            </a:prstGeom>
+            <a:noFill/>
+            <a:ln>
+              <a:solidFill>
+                <a:schemeClr val="tx1"/>
+              </a:solidFill>
+            </a:ln>
+          </p:spPr>
+          <p:style>
+            <a:lnRef idx="2">
+              <a:schemeClr val="accent1">
+                <a:shade val="50000"/>
+              </a:schemeClr>
+            </a:lnRef>
+            <a:fillRef idx="1">
+              <a:schemeClr val="accent1"/>
+            </a:fillRef>
+            <a:effectRef idx="0">
+              <a:schemeClr val="accent1"/>
+            </a:effectRef>
+            <a:fontRef idx="minor">
+              <a:schemeClr val="lt1"/>
+            </a:fontRef>
+          </p:style>
+          <p:txBody>
+            <a:bodyPr rtlCol="0" anchor="ctr"/>
+            <a:lstStyle/>
+            <a:p>
+              <a:pPr algn="ctr"/>
+              <a:r>
+                <a:rPr lang="en-US" dirty="0">
+                  <a:solidFill>
+                    <a:schemeClr val="tx1"/>
+                  </a:solidFill>
+                </a:rPr>
+                <a:t>Item</a:t>
+              </a:r>
+              <a:endParaRPr lang="en-PH" dirty="0">
+                <a:solidFill>
+                  <a:schemeClr val="tx1"/>
+                </a:solidFill>
+              </a:endParaRPr>
+            </a:p>
+          </p:txBody>
+        </p:sp>
+        <p:sp>
+          <p:nvSpPr>
+            <p:cNvPr id="8" name="Rectangle: Rounded Corners 7">
+              <a:extLst>
+                <a:ext uri="{FF2B5EF4-FFF2-40B4-BE49-F238E27FC236}">
+                  <a16:creationId xmlns:a16="http://schemas.microsoft.com/office/drawing/2014/main" id="{22BBF5C1-B0A6-4DD1-6355-FB19864E58FF}"/>
+                </a:ext>
+              </a:extLst>
+            </p:cNvPr>
+            <p:cNvSpPr/>
+            <p:nvPr/>
+          </p:nvSpPr>
+          <p:spPr>
+            <a:xfrm>
+              <a:off x="4198433" y="3025689"/>
+              <a:ext cx="1103971" cy="457199"/>
+            </a:xfrm>
+            <a:prstGeom prst="roundRect">
+              <a:avLst/>
+            </a:prstGeom>
+            <a:noFill/>
+            <a:ln>
+              <a:solidFill>
+                <a:schemeClr val="tx1"/>
+              </a:solidFill>
+            </a:ln>
+          </p:spPr>
+          <p:style>
+            <a:lnRef idx="2">
+              <a:schemeClr val="accent1">
+                <a:shade val="50000"/>
+              </a:schemeClr>
+            </a:lnRef>
+            <a:fillRef idx="1">
+              <a:schemeClr val="accent1"/>
+            </a:fillRef>
+            <a:effectRef idx="0">
+              <a:schemeClr val="accent1"/>
+            </a:effectRef>
+            <a:fontRef idx="minor">
+              <a:schemeClr val="lt1"/>
+            </a:fontRef>
+          </p:style>
+          <p:txBody>
+            <a:bodyPr rtlCol="0" anchor="ctr"/>
+            <a:lstStyle/>
+            <a:p>
+              <a:pPr algn="ctr"/>
+              <a:r>
+                <a:rPr lang="en-US" dirty="0">
+                  <a:solidFill>
+                    <a:schemeClr val="tx1"/>
+                  </a:solidFill>
+                </a:rPr>
+                <a:t>Item</a:t>
+              </a:r>
+              <a:endParaRPr lang="en-PH" dirty="0">
+                <a:solidFill>
+                  <a:schemeClr val="tx1"/>
+                </a:solidFill>
+              </a:endParaRPr>
+            </a:p>
+          </p:txBody>
+        </p:sp>
+        <p:sp>
+          <p:nvSpPr>
+            <p:cNvPr id="9" name="Rectangle 8">
+              <a:extLst>
+                <a:ext uri="{FF2B5EF4-FFF2-40B4-BE49-F238E27FC236}">
+                  <a16:creationId xmlns:a16="http://schemas.microsoft.com/office/drawing/2014/main" id="{E4B594EB-C957-A537-34EC-DEC37851619B}"/>
+                </a:ext>
+              </a:extLst>
+            </p:cNvPr>
+            <p:cNvSpPr/>
+            <p:nvPr/>
+          </p:nvSpPr>
+          <p:spPr>
+            <a:xfrm>
+              <a:off x="2397512" y="3668737"/>
+              <a:ext cx="7396975" cy="457199"/>
+            </a:xfrm>
+            <a:prstGeom prst="rect">
+              <a:avLst/>
+            </a:prstGeom>
+            <a:noFill/>
+            <a:ln>
+              <a:solidFill>
+                <a:schemeClr val="tx1"/>
+              </a:solidFill>
+            </a:ln>
+          </p:spPr>
+          <p:style>
+            <a:lnRef idx="2">
+              <a:schemeClr val="accent1">
+                <a:shade val="50000"/>
+              </a:schemeClr>
+            </a:lnRef>
+            <a:fillRef idx="1">
+              <a:schemeClr val="accent1"/>
+            </a:fillRef>
+            <a:effectRef idx="0">
+              <a:schemeClr val="accent1"/>
+            </a:effectRef>
+            <a:fontRef idx="minor">
+              <a:schemeClr val="lt1"/>
+            </a:fontRef>
+          </p:style>
+          <p:txBody>
+            <a:bodyPr rtlCol="0" anchor="ctr"/>
+            <a:lstStyle/>
+            <a:p>
+              <a:pPr algn="ctr"/>
+              <a:r>
+                <a:rPr lang="en-US" dirty="0">
+                  <a:solidFill>
+                    <a:schemeClr val="tx1"/>
+                  </a:solidFill>
+                </a:rPr>
+                <a:t>Description</a:t>
+              </a:r>
+              <a:endParaRPr lang="en-PH" dirty="0">
+                <a:solidFill>
+                  <a:schemeClr val="tx1"/>
+                </a:solidFill>
+              </a:endParaRPr>
+            </a:p>
+          </p:txBody>
+        </p:sp>
+        <p:sp>
+          <p:nvSpPr>
+            <p:cNvPr id="10" name="Rectangle: Rounded Corners 9">
+              <a:extLst>
+                <a:ext uri="{FF2B5EF4-FFF2-40B4-BE49-F238E27FC236}">
+                  <a16:creationId xmlns:a16="http://schemas.microsoft.com/office/drawing/2014/main" id="{B425DD4D-F1B3-9168-69C3-DC43C25E2038}"/>
+                </a:ext>
+              </a:extLst>
+            </p:cNvPr>
+            <p:cNvSpPr/>
+            <p:nvPr/>
+          </p:nvSpPr>
+          <p:spPr>
+            <a:xfrm>
+              <a:off x="4908393" y="4311785"/>
+              <a:ext cx="1103971" cy="457199"/>
+            </a:xfrm>
+            <a:prstGeom prst="roundRect">
+              <a:avLst/>
+            </a:prstGeom>
+            <a:noFill/>
+            <a:ln>
+              <a:solidFill>
+                <a:schemeClr val="tx1"/>
+              </a:solidFill>
+            </a:ln>
+          </p:spPr>
+          <p:style>
+            <a:lnRef idx="2">
+              <a:schemeClr val="accent1">
+                <a:shade val="50000"/>
+              </a:schemeClr>
+            </a:lnRef>
+            <a:fillRef idx="1">
+              <a:schemeClr val="accent1"/>
+            </a:fillRef>
+            <a:effectRef idx="0">
+              <a:schemeClr val="accent1"/>
+            </a:effectRef>
+            <a:fontRef idx="minor">
+              <a:schemeClr val="lt1"/>
+            </a:fontRef>
+          </p:style>
+          <p:txBody>
+            <a:bodyPr rtlCol="0" anchor="ctr"/>
+            <a:lstStyle/>
+            <a:p>
+              <a:pPr algn="ctr"/>
+              <a:r>
+                <a:rPr lang="en-US" dirty="0">
+                  <a:solidFill>
+                    <a:schemeClr val="tx1"/>
+                  </a:solidFill>
+                </a:rPr>
+                <a:t>Item</a:t>
+              </a:r>
+              <a:endParaRPr lang="en-PH" dirty="0">
+                <a:solidFill>
+                  <a:schemeClr val="tx1"/>
+                </a:solidFill>
+              </a:endParaRPr>
+            </a:p>
+          </p:txBody>
+        </p:sp>
+        <p:sp>
+          <p:nvSpPr>
+            <p:cNvPr id="11" name="Rectangle: Rounded Corners 10">
+              <a:extLst>
+                <a:ext uri="{FF2B5EF4-FFF2-40B4-BE49-F238E27FC236}">
+                  <a16:creationId xmlns:a16="http://schemas.microsoft.com/office/drawing/2014/main" id="{232E1270-69CB-2F7B-C443-7FAC0244AD49}"/>
+                </a:ext>
+              </a:extLst>
+            </p:cNvPr>
+            <p:cNvSpPr/>
+            <p:nvPr/>
+          </p:nvSpPr>
+          <p:spPr>
+            <a:xfrm>
+              <a:off x="6253973" y="4311785"/>
+              <a:ext cx="1103971" cy="457199"/>
+            </a:xfrm>
+            <a:prstGeom prst="roundRect">
+              <a:avLst/>
+            </a:prstGeom>
+            <a:noFill/>
+            <a:ln>
+              <a:solidFill>
+                <a:schemeClr val="tx1"/>
+              </a:solidFill>
+            </a:ln>
+          </p:spPr>
+          <p:style>
+            <a:lnRef idx="2">
+              <a:schemeClr val="accent1">
+                <a:shade val="50000"/>
+              </a:schemeClr>
+            </a:lnRef>
+            <a:fillRef idx="1">
+              <a:schemeClr val="accent1"/>
+            </a:fillRef>
+            <a:effectRef idx="0">
+              <a:schemeClr val="accent1"/>
+            </a:effectRef>
+            <a:fontRef idx="minor">
+              <a:schemeClr val="lt1"/>
+            </a:fontRef>
+          </p:style>
+          <p:txBody>
+            <a:bodyPr rtlCol="0" anchor="ctr"/>
+            <a:lstStyle/>
+            <a:p>
+              <a:pPr algn="ctr"/>
+              <a:r>
+                <a:rPr lang="en-US" dirty="0">
+                  <a:solidFill>
+                    <a:schemeClr val="tx1"/>
+                  </a:solidFill>
+                </a:rPr>
+                <a:t>Item</a:t>
+              </a:r>
+              <a:endParaRPr lang="en-PH" dirty="0">
+                <a:solidFill>
+                  <a:schemeClr val="tx1"/>
+                </a:solidFill>
+              </a:endParaRPr>
+            </a:p>
+          </p:txBody>
+        </p:sp>
+        <p:sp>
+          <p:nvSpPr>
+            <p:cNvPr id="12" name="Rectangle: Rounded Corners 11">
+              <a:extLst>
+                <a:ext uri="{FF2B5EF4-FFF2-40B4-BE49-F238E27FC236}">
+                  <a16:creationId xmlns:a16="http://schemas.microsoft.com/office/drawing/2014/main" id="{AACE96A0-A850-B626-75E5-03CC63A11BC0}"/>
+                </a:ext>
+              </a:extLst>
+            </p:cNvPr>
+            <p:cNvSpPr/>
+            <p:nvPr/>
+          </p:nvSpPr>
+          <p:spPr>
+            <a:xfrm>
+              <a:off x="3562813" y="4311785"/>
+              <a:ext cx="1103971" cy="457199"/>
+            </a:xfrm>
+            <a:prstGeom prst="roundRect">
+              <a:avLst/>
+            </a:prstGeom>
+            <a:noFill/>
+            <a:ln>
+              <a:solidFill>
+                <a:schemeClr val="tx1"/>
+              </a:solidFill>
+            </a:ln>
+          </p:spPr>
+          <p:style>
+            <a:lnRef idx="2">
+              <a:schemeClr val="accent1">
+                <a:shade val="50000"/>
+              </a:schemeClr>
+            </a:lnRef>
+            <a:fillRef idx="1">
+              <a:schemeClr val="accent1"/>
+            </a:fillRef>
+            <a:effectRef idx="0">
+              <a:schemeClr val="accent1"/>
+            </a:effectRef>
+            <a:fontRef idx="minor">
+              <a:schemeClr val="lt1"/>
+            </a:fontRef>
+          </p:style>
+          <p:txBody>
+            <a:bodyPr rtlCol="0" anchor="ctr"/>
+            <a:lstStyle/>
+            <a:p>
+              <a:pPr algn="ctr"/>
+              <a:r>
+                <a:rPr lang="en-US" dirty="0">
+                  <a:solidFill>
+                    <a:schemeClr val="tx1"/>
+                  </a:solidFill>
+                </a:rPr>
+                <a:t>Item</a:t>
+              </a:r>
+              <a:endParaRPr lang="en-PH" dirty="0">
+                <a:solidFill>
+                  <a:schemeClr val="tx1"/>
+                </a:solidFill>
+              </a:endParaRPr>
+            </a:p>
+          </p:txBody>
+        </p:sp>
+        <p:sp>
+          <p:nvSpPr>
+            <p:cNvPr id="13" name="Rectangle: Rounded Corners 12">
+              <a:extLst>
+                <a:ext uri="{FF2B5EF4-FFF2-40B4-BE49-F238E27FC236}">
+                  <a16:creationId xmlns:a16="http://schemas.microsoft.com/office/drawing/2014/main" id="{6EAB841F-8A62-F6DC-48AB-3742650CDD2F}"/>
+                </a:ext>
+              </a:extLst>
+            </p:cNvPr>
+            <p:cNvSpPr/>
+            <p:nvPr/>
+          </p:nvSpPr>
+          <p:spPr>
+            <a:xfrm>
+              <a:off x="7599553" y="4337779"/>
+              <a:ext cx="1103971" cy="457199"/>
+            </a:xfrm>
+            <a:prstGeom prst="roundRect">
+              <a:avLst/>
+            </a:prstGeom>
+            <a:noFill/>
+            <a:ln>
+              <a:solidFill>
+                <a:schemeClr val="tx1"/>
+              </a:solidFill>
+            </a:ln>
+          </p:spPr>
+          <p:style>
+            <a:lnRef idx="2">
+              <a:schemeClr val="accent1">
+                <a:shade val="50000"/>
+              </a:schemeClr>
+            </a:lnRef>
+            <a:fillRef idx="1">
+              <a:schemeClr val="accent1"/>
+            </a:fillRef>
+            <a:effectRef idx="0">
+              <a:schemeClr val="accent1"/>
+            </a:effectRef>
+            <a:fontRef idx="minor">
+              <a:schemeClr val="lt1"/>
+            </a:fontRef>
+          </p:style>
+          <p:txBody>
+            <a:bodyPr rtlCol="0" anchor="ctr"/>
+            <a:lstStyle/>
+            <a:p>
+              <a:pPr algn="ctr"/>
+              <a:r>
+                <a:rPr lang="en-US" dirty="0">
+                  <a:solidFill>
+                    <a:schemeClr val="tx1"/>
+                  </a:solidFill>
+                </a:rPr>
+                <a:t>Item</a:t>
+              </a:r>
+              <a:endParaRPr lang="en-PH" dirty="0">
+                <a:solidFill>
+                  <a:schemeClr val="tx1"/>
+                </a:solidFill>
+              </a:endParaRPr>
+            </a:p>
+          </p:txBody>
+        </p:sp>
+      </p:grpSp>
+    </p:spTree>
+    <p:extLst>
+      <p:ext uri="{BB962C8B-B14F-4D97-AF65-F5344CB8AC3E}">
+        <p14:creationId xmlns:p14="http://schemas.microsoft.com/office/powerpoint/2010/main" val="3145336687"/>
+      </p:ext>
+    </p:extLst>
+  </p:cSld>
+  <p:clrMapOvr>
+    <a:masterClrMapping/>
+  </p:clrMapOvr>
+</p:sld>
+</file>
+
 <file path=ppt/theme/theme1.xml><?xml version="1.0" encoding="utf-8"?>
 <a:theme xmlns:a="http://schemas.openxmlformats.org/drawingml/2006/main" name="Office Theme">
   <a:themeElements>

</xml_diff>

<commit_message>
name updates and stuff
</commit_message>
<xml_diff>
--- a/prototypes.pptx
+++ b/prototypes.pptx
@@ -266,7 +266,7 @@
           <a:p>
             <a:fld id="{C22641D2-7F79-4E7E-AC74-EE1FF232D5BA}" type="datetimeFigureOut">
               <a:rPr lang="en-PH" smtClean="0"/>
-              <a:t>04/07/2023</a:t>
+              <a:t>07/07/2023</a:t>
             </a:fld>
             <a:endParaRPr lang="en-PH"/>
           </a:p>
@@ -466,7 +466,7 @@
           <a:p>
             <a:fld id="{C22641D2-7F79-4E7E-AC74-EE1FF232D5BA}" type="datetimeFigureOut">
               <a:rPr lang="en-PH" smtClean="0"/>
-              <a:t>04/07/2023</a:t>
+              <a:t>07/07/2023</a:t>
             </a:fld>
             <a:endParaRPr lang="en-PH"/>
           </a:p>
@@ -676,7 +676,7 @@
           <a:p>
             <a:fld id="{C22641D2-7F79-4E7E-AC74-EE1FF232D5BA}" type="datetimeFigureOut">
               <a:rPr lang="en-PH" smtClean="0"/>
-              <a:t>04/07/2023</a:t>
+              <a:t>07/07/2023</a:t>
             </a:fld>
             <a:endParaRPr lang="en-PH"/>
           </a:p>
@@ -876,7 +876,7 @@
           <a:p>
             <a:fld id="{C22641D2-7F79-4E7E-AC74-EE1FF232D5BA}" type="datetimeFigureOut">
               <a:rPr lang="en-PH" smtClean="0"/>
-              <a:t>04/07/2023</a:t>
+              <a:t>07/07/2023</a:t>
             </a:fld>
             <a:endParaRPr lang="en-PH"/>
           </a:p>
@@ -1152,7 +1152,7 @@
           <a:p>
             <a:fld id="{C22641D2-7F79-4E7E-AC74-EE1FF232D5BA}" type="datetimeFigureOut">
               <a:rPr lang="en-PH" smtClean="0"/>
-              <a:t>04/07/2023</a:t>
+              <a:t>07/07/2023</a:t>
             </a:fld>
             <a:endParaRPr lang="en-PH"/>
           </a:p>
@@ -1420,7 +1420,7 @@
           <a:p>
             <a:fld id="{C22641D2-7F79-4E7E-AC74-EE1FF232D5BA}" type="datetimeFigureOut">
               <a:rPr lang="en-PH" smtClean="0"/>
-              <a:t>04/07/2023</a:t>
+              <a:t>07/07/2023</a:t>
             </a:fld>
             <a:endParaRPr lang="en-PH"/>
           </a:p>
@@ -1835,7 +1835,7 @@
           <a:p>
             <a:fld id="{C22641D2-7F79-4E7E-AC74-EE1FF232D5BA}" type="datetimeFigureOut">
               <a:rPr lang="en-PH" smtClean="0"/>
-              <a:t>04/07/2023</a:t>
+              <a:t>07/07/2023</a:t>
             </a:fld>
             <a:endParaRPr lang="en-PH"/>
           </a:p>
@@ -1977,7 +1977,7 @@
           <a:p>
             <a:fld id="{C22641D2-7F79-4E7E-AC74-EE1FF232D5BA}" type="datetimeFigureOut">
               <a:rPr lang="en-PH" smtClean="0"/>
-              <a:t>04/07/2023</a:t>
+              <a:t>07/07/2023</a:t>
             </a:fld>
             <a:endParaRPr lang="en-PH"/>
           </a:p>
@@ -2090,7 +2090,7 @@
           <a:p>
             <a:fld id="{C22641D2-7F79-4E7E-AC74-EE1FF232D5BA}" type="datetimeFigureOut">
               <a:rPr lang="en-PH" smtClean="0"/>
-              <a:t>04/07/2023</a:t>
+              <a:t>07/07/2023</a:t>
             </a:fld>
             <a:endParaRPr lang="en-PH"/>
           </a:p>
@@ -2403,7 +2403,7 @@
           <a:p>
             <a:fld id="{C22641D2-7F79-4E7E-AC74-EE1FF232D5BA}" type="datetimeFigureOut">
               <a:rPr lang="en-PH" smtClean="0"/>
-              <a:t>04/07/2023</a:t>
+              <a:t>07/07/2023</a:t>
             </a:fld>
             <a:endParaRPr lang="en-PH"/>
           </a:p>
@@ -2692,7 +2692,7 @@
           <a:p>
             <a:fld id="{C22641D2-7F79-4E7E-AC74-EE1FF232D5BA}" type="datetimeFigureOut">
               <a:rPr lang="en-PH" smtClean="0"/>
-              <a:t>04/07/2023</a:t>
+              <a:t>07/07/2023</a:t>
             </a:fld>
             <a:endParaRPr lang="en-PH"/>
           </a:p>
@@ -2935,7 +2935,7 @@
           <a:p>
             <a:fld id="{C22641D2-7F79-4E7E-AC74-EE1FF232D5BA}" type="datetimeFigureOut">
               <a:rPr lang="en-PH" smtClean="0"/>
-              <a:t>04/07/2023</a:t>
+              <a:t>07/07/2023</a:t>
             </a:fld>
             <a:endParaRPr lang="en-PH"/>
           </a:p>
@@ -3563,7 +3563,7 @@
         <p:spPr>
           <a:xfrm>
             <a:off x="0" y="6488668"/>
-            <a:ext cx="797782" cy="369332"/>
+            <a:ext cx="985334" cy="369332"/>
           </a:xfrm>
           <a:prstGeom prst="rect">
             <a:avLst/>
@@ -3584,7 +3584,7 @@
                   </a:schemeClr>
                 </a:solidFill>
               </a:rPr>
-              <a:t>Type 1</a:t>
+              <a:t>Type 1-1</a:t>
             </a:r>
             <a:endParaRPr lang="en-PH" dirty="0">
               <a:solidFill>
@@ -3790,7 +3790,7 @@
         <p:spPr>
           <a:xfrm>
             <a:off x="0" y="6488668"/>
-            <a:ext cx="797782" cy="369332"/>
+            <a:ext cx="985334" cy="369332"/>
           </a:xfrm>
           <a:prstGeom prst="rect">
             <a:avLst/>
@@ -3811,7 +3811,7 @@
                   </a:schemeClr>
                 </a:solidFill>
               </a:rPr>
-              <a:t>Type 2</a:t>
+              <a:t>Type 1-2</a:t>
             </a:r>
             <a:endParaRPr lang="en-PH" dirty="0">
               <a:solidFill>
@@ -4064,7 +4064,7 @@
         <p:spPr>
           <a:xfrm>
             <a:off x="0" y="6488668"/>
-            <a:ext cx="797782" cy="369332"/>
+            <a:ext cx="985334" cy="369332"/>
           </a:xfrm>
           <a:prstGeom prst="rect">
             <a:avLst/>
@@ -4085,7 +4085,7 @@
                   </a:schemeClr>
                 </a:solidFill>
               </a:rPr>
-              <a:t>Type 3</a:t>
+              <a:t>Type 1-3</a:t>
             </a:r>
             <a:endParaRPr lang="en-PH" dirty="0">
               <a:solidFill>
@@ -4291,7 +4291,7 @@
         <p:spPr>
           <a:xfrm>
             <a:off x="0" y="6488668"/>
-            <a:ext cx="797782" cy="369332"/>
+            <a:ext cx="985334" cy="369332"/>
           </a:xfrm>
           <a:prstGeom prst="rect">
             <a:avLst/>
@@ -4305,14 +4305,14 @@
           <a:lstStyle/>
           <a:p>
             <a:r>
-              <a:rPr lang="en-US">
+              <a:rPr lang="en-US" dirty="0">
                 <a:solidFill>
                   <a:schemeClr val="bg1">
                     <a:lumMod val="50000"/>
                   </a:schemeClr>
                 </a:solidFill>
               </a:rPr>
-              <a:t>Type 4</a:t>
+              <a:t>Type 1-4</a:t>
             </a:r>
             <a:endParaRPr lang="en-PH" dirty="0">
               <a:solidFill>
@@ -4369,7 +4369,7 @@
         <p:spPr>
           <a:xfrm>
             <a:off x="0" y="6488668"/>
-            <a:ext cx="797782" cy="369332"/>
+            <a:ext cx="985334" cy="369332"/>
           </a:xfrm>
           <a:prstGeom prst="rect">
             <a:avLst/>
@@ -4383,14 +4383,14 @@
           <a:lstStyle/>
           <a:p>
             <a:r>
-              <a:rPr lang="en-US" dirty="0">
+              <a:rPr lang="en-US">
                 <a:solidFill>
                   <a:schemeClr val="bg1">
                     <a:lumMod val="50000"/>
                   </a:schemeClr>
                 </a:solidFill>
               </a:rPr>
-              <a:t>Type 5</a:t>
+              <a:t>Type 1-5</a:t>
             </a:r>
             <a:endParaRPr lang="en-PH" dirty="0">
               <a:solidFill>

</xml_diff>

<commit_message>
yet another section complete!
</commit_message>
<xml_diff>
--- a/prototypes.pptx
+++ b/prototypes.pptx
@@ -5108,7 +5108,7 @@
         <p:spPr>
           <a:xfrm>
             <a:off x="0" y="6488668"/>
-            <a:ext cx="797782" cy="369332"/>
+            <a:ext cx="985334" cy="369332"/>
           </a:xfrm>
           <a:prstGeom prst="rect">
             <a:avLst/>
@@ -5122,14 +5122,14 @@
           <a:lstStyle/>
           <a:p>
             <a:r>
-              <a:rPr lang="en-US">
+              <a:rPr lang="en-US" dirty="0">
                 <a:solidFill>
                   <a:schemeClr val="bg1">
                     <a:lumMod val="50000"/>
                   </a:schemeClr>
                 </a:solidFill>
               </a:rPr>
-              <a:t>Type 6</a:t>
+              <a:t>Type 1-6</a:t>
             </a:r>
             <a:endParaRPr lang="en-PH" dirty="0">
               <a:solidFill>
@@ -5141,12 +5141,140 @@
           </a:p>
         </p:txBody>
       </p:sp>
+      <p:sp>
+        <p:nvSpPr>
+          <p:cNvPr id="2" name="Rectangle 1">
+            <a:extLst>
+              <a:ext uri="{FF2B5EF4-FFF2-40B4-BE49-F238E27FC236}">
+                <a16:creationId xmlns:a16="http://schemas.microsoft.com/office/drawing/2014/main" id="{928F0843-1E89-F1C3-DE80-156539E36E22}"/>
+              </a:ext>
+            </a:extLst>
+          </p:cNvPr>
+          <p:cNvSpPr/>
+          <p:nvPr/>
+        </p:nvSpPr>
+        <p:spPr>
+          <a:xfrm>
+            <a:off x="2397512" y="557563"/>
+            <a:ext cx="7396975" cy="457199"/>
+          </a:xfrm>
+          <a:prstGeom prst="rect">
+            <a:avLst/>
+          </a:prstGeom>
+          <a:noFill/>
+          <a:ln>
+            <a:solidFill>
+              <a:schemeClr val="tx1"/>
+            </a:solidFill>
+          </a:ln>
+        </p:spPr>
+        <p:style>
+          <a:lnRef idx="2">
+            <a:schemeClr val="accent1">
+              <a:shade val="50000"/>
+            </a:schemeClr>
+          </a:lnRef>
+          <a:fillRef idx="1">
+            <a:schemeClr val="accent1"/>
+          </a:fillRef>
+          <a:effectRef idx="0">
+            <a:schemeClr val="accent1"/>
+          </a:effectRef>
+          <a:fontRef idx="minor">
+            <a:schemeClr val="lt1"/>
+          </a:fontRef>
+        </p:style>
+        <p:txBody>
+          <a:bodyPr rtlCol="0" anchor="ctr"/>
+          <a:lstStyle/>
+          <a:p>
+            <a:pPr algn="ctr"/>
+            <a:r>
+              <a:rPr lang="en-US" dirty="0">
+                <a:solidFill>
+                  <a:schemeClr val="tx1"/>
+                </a:solidFill>
+              </a:rPr>
+              <a:t>Description Title</a:t>
+            </a:r>
+            <a:endParaRPr lang="en-PH" dirty="0">
+              <a:solidFill>
+                <a:schemeClr val="tx1"/>
+              </a:solidFill>
+            </a:endParaRPr>
+          </a:p>
+        </p:txBody>
+      </p:sp>
+      <p:sp>
+        <p:nvSpPr>
+          <p:cNvPr id="3" name="Rectangle 2">
+            <a:extLst>
+              <a:ext uri="{FF2B5EF4-FFF2-40B4-BE49-F238E27FC236}">
+                <a16:creationId xmlns:a16="http://schemas.microsoft.com/office/drawing/2014/main" id="{205E017C-E00D-F5A0-AA96-5976DDC5C0E0}"/>
+              </a:ext>
+            </a:extLst>
+          </p:cNvPr>
+          <p:cNvSpPr/>
+          <p:nvPr/>
+        </p:nvSpPr>
+        <p:spPr>
+          <a:xfrm>
+            <a:off x="2397512" y="1200612"/>
+            <a:ext cx="7396975" cy="457199"/>
+          </a:xfrm>
+          <a:prstGeom prst="rect">
+            <a:avLst/>
+          </a:prstGeom>
+          <a:noFill/>
+          <a:ln>
+            <a:solidFill>
+              <a:schemeClr val="tx1"/>
+            </a:solidFill>
+          </a:ln>
+        </p:spPr>
+        <p:style>
+          <a:lnRef idx="2">
+            <a:schemeClr val="accent1">
+              <a:shade val="50000"/>
+            </a:schemeClr>
+          </a:lnRef>
+          <a:fillRef idx="1">
+            <a:schemeClr val="accent1"/>
+          </a:fillRef>
+          <a:effectRef idx="0">
+            <a:schemeClr val="accent1"/>
+          </a:effectRef>
+          <a:fontRef idx="minor">
+            <a:schemeClr val="lt1"/>
+          </a:fontRef>
+        </p:style>
+        <p:txBody>
+          <a:bodyPr rtlCol="0" anchor="ctr"/>
+          <a:lstStyle/>
+          <a:p>
+            <a:pPr algn="ctr"/>
+            <a:r>
+              <a:rPr lang="en-US" dirty="0">
+                <a:solidFill>
+                  <a:schemeClr val="tx1"/>
+                </a:solidFill>
+              </a:rPr>
+              <a:t>Description</a:t>
+            </a:r>
+            <a:endParaRPr lang="en-PH" dirty="0">
+              <a:solidFill>
+                <a:schemeClr val="tx1"/>
+              </a:solidFill>
+            </a:endParaRPr>
+          </a:p>
+        </p:txBody>
+      </p:sp>
       <p:grpSp>
         <p:nvGrpSpPr>
-          <p:cNvPr id="14" name="Group 13">
-            <a:extLst>
-              <a:ext uri="{FF2B5EF4-FFF2-40B4-BE49-F238E27FC236}">
-                <a16:creationId xmlns:a16="http://schemas.microsoft.com/office/drawing/2014/main" id="{74EED465-5107-73B0-DEA6-C06663E9FBC6}"/>
+          <p:cNvPr id="19" name="Group 18">
+            <a:extLst>
+              <a:ext uri="{FF2B5EF4-FFF2-40B4-BE49-F238E27FC236}">
+                <a16:creationId xmlns:a16="http://schemas.microsoft.com/office/drawing/2014/main" id="{8F1F0ED8-0CC3-21D9-4D3F-96A5A620F8CE}"/>
               </a:ext>
             </a:extLst>
           </p:cNvPr>
@@ -5155,18 +5283,18 @@
         </p:nvGrpSpPr>
         <p:grpSpPr>
           <a:xfrm>
-            <a:off x="2397512" y="1739592"/>
-            <a:ext cx="7396975" cy="3055386"/>
-            <a:chOff x="2397512" y="1739592"/>
-            <a:chExt cx="7396975" cy="3055386"/>
+            <a:off x="1251652" y="1843662"/>
+            <a:ext cx="3077737" cy="1189469"/>
+            <a:chOff x="2397512" y="1843660"/>
+            <a:chExt cx="3698488" cy="1461053"/>
           </a:xfrm>
         </p:grpSpPr>
         <p:sp>
           <p:nvSpPr>
-            <p:cNvPr id="2" name="Rectangle 1">
+            <p:cNvPr id="8" name="Rectangle: Rounded Corners 7">
               <a:extLst>
                 <a:ext uri="{FF2B5EF4-FFF2-40B4-BE49-F238E27FC236}">
-                  <a16:creationId xmlns:a16="http://schemas.microsoft.com/office/drawing/2014/main" id="{928F0843-1E89-F1C3-DE80-156539E36E22}"/>
+                  <a16:creationId xmlns:a16="http://schemas.microsoft.com/office/drawing/2014/main" id="{22BBF5C1-B0A6-4DD1-6355-FB19864E58FF}"/>
                 </a:ext>
               </a:extLst>
             </p:cNvPr>
@@ -5175,136 +5303,8 @@
           </p:nvSpPr>
           <p:spPr>
             <a:xfrm>
-              <a:off x="2397512" y="1739592"/>
-              <a:ext cx="7396975" cy="457199"/>
-            </a:xfrm>
-            <a:prstGeom prst="rect">
-              <a:avLst/>
-            </a:prstGeom>
-            <a:noFill/>
-            <a:ln>
-              <a:solidFill>
-                <a:schemeClr val="tx1"/>
-              </a:solidFill>
-            </a:ln>
-          </p:spPr>
-          <p:style>
-            <a:lnRef idx="2">
-              <a:schemeClr val="accent1">
-                <a:shade val="50000"/>
-              </a:schemeClr>
-            </a:lnRef>
-            <a:fillRef idx="1">
-              <a:schemeClr val="accent1"/>
-            </a:fillRef>
-            <a:effectRef idx="0">
-              <a:schemeClr val="accent1"/>
-            </a:effectRef>
-            <a:fontRef idx="minor">
-              <a:schemeClr val="lt1"/>
-            </a:fontRef>
-          </p:style>
-          <p:txBody>
-            <a:bodyPr rtlCol="0" anchor="ctr"/>
-            <a:lstStyle/>
-            <a:p>
-              <a:pPr algn="ctr"/>
-              <a:r>
-                <a:rPr lang="en-US" dirty="0">
-                  <a:solidFill>
-                    <a:schemeClr val="tx1"/>
-                  </a:solidFill>
-                </a:rPr>
-                <a:t>Description Title</a:t>
-              </a:r>
-              <a:endParaRPr lang="en-PH" dirty="0">
-                <a:solidFill>
-                  <a:schemeClr val="tx1"/>
-                </a:solidFill>
-              </a:endParaRPr>
-            </a:p>
-          </p:txBody>
-        </p:sp>
-        <p:sp>
-          <p:nvSpPr>
-            <p:cNvPr id="3" name="Rectangle 2">
-              <a:extLst>
-                <a:ext uri="{FF2B5EF4-FFF2-40B4-BE49-F238E27FC236}">
-                  <a16:creationId xmlns:a16="http://schemas.microsoft.com/office/drawing/2014/main" id="{205E017C-E00D-F5A0-AA96-5976DDC5C0E0}"/>
-                </a:ext>
-              </a:extLst>
-            </p:cNvPr>
-            <p:cNvSpPr/>
-            <p:nvPr/>
-          </p:nvSpPr>
-          <p:spPr>
-            <a:xfrm>
-              <a:off x="2397512" y="2382641"/>
-              <a:ext cx="7396975" cy="457199"/>
-            </a:xfrm>
-            <a:prstGeom prst="rect">
-              <a:avLst/>
-            </a:prstGeom>
-            <a:noFill/>
-            <a:ln>
-              <a:solidFill>
-                <a:schemeClr val="tx1"/>
-              </a:solidFill>
-            </a:ln>
-          </p:spPr>
-          <p:style>
-            <a:lnRef idx="2">
-              <a:schemeClr val="accent1">
-                <a:shade val="50000"/>
-              </a:schemeClr>
-            </a:lnRef>
-            <a:fillRef idx="1">
-              <a:schemeClr val="accent1"/>
-            </a:fillRef>
-            <a:effectRef idx="0">
-              <a:schemeClr val="accent1"/>
-            </a:effectRef>
-            <a:fontRef idx="minor">
-              <a:schemeClr val="lt1"/>
-            </a:fontRef>
-          </p:style>
-          <p:txBody>
-            <a:bodyPr rtlCol="0" anchor="ctr"/>
-            <a:lstStyle/>
-            <a:p>
-              <a:pPr algn="ctr"/>
-              <a:r>
-                <a:rPr lang="en-US" dirty="0">
-                  <a:solidFill>
-                    <a:schemeClr val="tx1"/>
-                  </a:solidFill>
-                </a:rPr>
-                <a:t>Description</a:t>
-              </a:r>
-              <a:endParaRPr lang="en-PH" dirty="0">
-                <a:solidFill>
-                  <a:schemeClr val="tx1"/>
-                </a:solidFill>
-              </a:endParaRPr>
-            </a:p>
-          </p:txBody>
-        </p:sp>
-        <p:sp>
-          <p:nvSpPr>
-            <p:cNvPr id="6" name="Rectangle: Rounded Corners 5">
-              <a:extLst>
-                <a:ext uri="{FF2B5EF4-FFF2-40B4-BE49-F238E27FC236}">
-                  <a16:creationId xmlns:a16="http://schemas.microsoft.com/office/drawing/2014/main" id="{390567E5-339A-0BE8-34BB-DA4129F0889B}"/>
-                </a:ext>
-              </a:extLst>
-            </p:cNvPr>
-            <p:cNvSpPr/>
-            <p:nvPr/>
-          </p:nvSpPr>
-          <p:spPr>
-            <a:xfrm>
-              <a:off x="5544013" y="3025689"/>
-              <a:ext cx="1103971" cy="457199"/>
+              <a:off x="2397512" y="1843660"/>
+              <a:ext cx="3698488" cy="1461053"/>
             </a:xfrm>
             <a:prstGeom prst="roundRect">
               <a:avLst/>
@@ -5337,13 +5337,114 @@
             <a:lstStyle/>
             <a:p>
               <a:pPr algn="ctr"/>
+              <a:endParaRPr lang="en-PH" dirty="0">
+                <a:solidFill>
+                  <a:schemeClr val="tx1"/>
+                </a:solidFill>
+              </a:endParaRPr>
+            </a:p>
+          </p:txBody>
+        </p:sp>
+        <p:pic>
+          <p:nvPicPr>
+            <p:cNvPr id="16" name="Picture 2">
+              <a:extLst>
+                <a:ext uri="{FF2B5EF4-FFF2-40B4-BE49-F238E27FC236}">
+                  <a16:creationId xmlns:a16="http://schemas.microsoft.com/office/drawing/2014/main" id="{442C1610-A081-92E7-D8C6-5B3FA2C4A22E}"/>
+                </a:ext>
+              </a:extLst>
+            </p:cNvPr>
+            <p:cNvPicPr>
+              <a:picLocks noChangeAspect="1" noChangeArrowheads="1"/>
+            </p:cNvPicPr>
+            <p:nvPr/>
+          </p:nvPicPr>
+          <p:blipFill>
+            <a:blip r:embed="rId2">
+              <a:extLst>
+                <a:ext uri="{28A0092B-C50C-407E-A947-70E740481C1C}">
+                  <a14:useLocalDpi xmlns:a14="http://schemas.microsoft.com/office/drawing/2010/main" val="0"/>
+                </a:ext>
+              </a:extLst>
+            </a:blip>
+            <a:srcRect/>
+            <a:stretch>
+              <a:fillRect/>
+            </a:stretch>
+          </p:blipFill>
+          <p:spPr bwMode="auto">
+            <a:xfrm>
+              <a:off x="2671187" y="2118731"/>
+              <a:ext cx="1087984" cy="843549"/>
+            </a:xfrm>
+            <a:prstGeom prst="rect">
+              <a:avLst/>
+            </a:prstGeom>
+            <a:noFill/>
+            <a:extLst>
+              <a:ext uri="{909E8E84-426E-40DD-AFC4-6F175D3DCCD1}">
+                <a14:hiddenFill xmlns:a14="http://schemas.microsoft.com/office/drawing/2010/main">
+                  <a:solidFill>
+                    <a:srgbClr val="FFFFFF"/>
+                  </a:solidFill>
+                </a14:hiddenFill>
+              </a:ext>
+            </a:extLst>
+          </p:spPr>
+        </p:pic>
+        <p:sp>
+          <p:nvSpPr>
+            <p:cNvPr id="17" name="Rectangle: Rounded Corners 16">
+              <a:extLst>
+                <a:ext uri="{FF2B5EF4-FFF2-40B4-BE49-F238E27FC236}">
+                  <a16:creationId xmlns:a16="http://schemas.microsoft.com/office/drawing/2014/main" id="{06DB13F4-7A9F-D495-34B2-DB455BA7C179}"/>
+                </a:ext>
+              </a:extLst>
+            </p:cNvPr>
+            <p:cNvSpPr/>
+            <p:nvPr/>
+          </p:nvSpPr>
+          <p:spPr>
+            <a:xfrm>
+              <a:off x="3914111" y="2118731"/>
+              <a:ext cx="1729828" cy="457199"/>
+            </a:xfrm>
+            <a:prstGeom prst="roundRect">
+              <a:avLst/>
+            </a:prstGeom>
+            <a:noFill/>
+            <a:ln>
+              <a:noFill/>
+            </a:ln>
+          </p:spPr>
+          <p:style>
+            <a:lnRef idx="2">
+              <a:schemeClr val="accent1">
+                <a:shade val="50000"/>
+              </a:schemeClr>
+            </a:lnRef>
+            <a:fillRef idx="1">
+              <a:schemeClr val="accent1"/>
+            </a:fillRef>
+            <a:effectRef idx="0">
+              <a:schemeClr val="accent1"/>
+            </a:effectRef>
+            <a:fontRef idx="minor">
+              <a:schemeClr val="lt1"/>
+            </a:fontRef>
+          </p:style>
+          <p:txBody>
+            <a:bodyPr rtlCol="0" anchor="ctr"/>
+            <a:lstStyle/>
+            <a:p>
+              <a:pPr algn="ctr"/>
               <a:r>
                 <a:rPr lang="en-US" dirty="0">
                   <a:solidFill>
                     <a:schemeClr val="tx1"/>
                   </a:solidFill>
                 </a:rPr>
-                <a:t>Item</a:t>
+                <a:t>Item name</a:t>
               </a:r>
               <a:endParaRPr lang="en-PH" dirty="0">
                 <a:solidFill>
@@ -5355,10 +5456,10 @@
         </p:sp>
         <p:sp>
           <p:nvSpPr>
-            <p:cNvPr id="7" name="Rectangle: Rounded Corners 6">
+            <p:cNvPr id="18" name="Rectangle: Rounded Corners 17">
               <a:extLst>
                 <a:ext uri="{FF2B5EF4-FFF2-40B4-BE49-F238E27FC236}">
-                  <a16:creationId xmlns:a16="http://schemas.microsoft.com/office/drawing/2014/main" id="{BD3DF30E-3621-75D1-E156-3AB540002325}"/>
+                  <a16:creationId xmlns:a16="http://schemas.microsoft.com/office/drawing/2014/main" id="{CD0D6B45-FE10-21A8-9F79-AD011ED183CE}"/>
                 </a:ext>
               </a:extLst>
             </p:cNvPr>
@@ -5367,8 +5468,91 @@
           </p:nvSpPr>
           <p:spPr>
             <a:xfrm>
-              <a:off x="6889593" y="3025689"/>
-              <a:ext cx="1103971" cy="457199"/>
+              <a:off x="3914111" y="2668256"/>
+              <a:ext cx="1729828" cy="457199"/>
+            </a:xfrm>
+            <a:prstGeom prst="roundRect">
+              <a:avLst/>
+            </a:prstGeom>
+            <a:noFill/>
+            <a:ln>
+              <a:noFill/>
+            </a:ln>
+          </p:spPr>
+          <p:style>
+            <a:lnRef idx="2">
+              <a:schemeClr val="accent1">
+                <a:shade val="50000"/>
+              </a:schemeClr>
+            </a:lnRef>
+            <a:fillRef idx="1">
+              <a:schemeClr val="accent1"/>
+            </a:fillRef>
+            <a:effectRef idx="0">
+              <a:schemeClr val="accent1"/>
+            </a:effectRef>
+            <a:fontRef idx="minor">
+              <a:schemeClr val="lt1"/>
+            </a:fontRef>
+          </p:style>
+          <p:txBody>
+            <a:bodyPr rtlCol="0" anchor="ctr"/>
+            <a:lstStyle/>
+            <a:p>
+              <a:pPr algn="ctr"/>
+              <a:r>
+                <a:rPr lang="en-US" sz="1400" dirty="0">
+                  <a:solidFill>
+                    <a:schemeClr val="tx1"/>
+                  </a:solidFill>
+                </a:rPr>
+                <a:t>Item description</a:t>
+              </a:r>
+              <a:endParaRPr lang="en-PH" sz="1400" dirty="0">
+                <a:solidFill>
+                  <a:schemeClr val="tx1"/>
+                </a:solidFill>
+              </a:endParaRPr>
+            </a:p>
+          </p:txBody>
+        </p:sp>
+      </p:grpSp>
+      <p:grpSp>
+        <p:nvGrpSpPr>
+          <p:cNvPr id="4" name="Group 3">
+            <a:extLst>
+              <a:ext uri="{FF2B5EF4-FFF2-40B4-BE49-F238E27FC236}">
+                <a16:creationId xmlns:a16="http://schemas.microsoft.com/office/drawing/2014/main" id="{A65C4778-86E1-9AEF-5F94-29A566681DA7}"/>
+              </a:ext>
+            </a:extLst>
+          </p:cNvPr>
+          <p:cNvGrpSpPr/>
+          <p:nvPr/>
+        </p:nvGrpSpPr>
+        <p:grpSpPr>
+          <a:xfrm>
+            <a:off x="4557131" y="1843661"/>
+            <a:ext cx="3077737" cy="1189469"/>
+            <a:chOff x="2397512" y="1843660"/>
+            <a:chExt cx="3698488" cy="1461053"/>
+          </a:xfrm>
+        </p:grpSpPr>
+        <p:sp>
+          <p:nvSpPr>
+            <p:cNvPr id="6" name="Rectangle: Rounded Corners 5">
+              <a:extLst>
+                <a:ext uri="{FF2B5EF4-FFF2-40B4-BE49-F238E27FC236}">
+                  <a16:creationId xmlns:a16="http://schemas.microsoft.com/office/drawing/2014/main" id="{DCB23ABB-FF64-0969-E59F-182236AF60E4}"/>
+                </a:ext>
+              </a:extLst>
+            </p:cNvPr>
+            <p:cNvSpPr/>
+            <p:nvPr/>
+          </p:nvSpPr>
+          <p:spPr>
+            <a:xfrm>
+              <a:off x="2397512" y="1843660"/>
+              <a:ext cx="3698488" cy="1461053"/>
             </a:xfrm>
             <a:prstGeom prst="roundRect">
               <a:avLst/>
@@ -5401,13 +5585,114 @@
             <a:lstStyle/>
             <a:p>
               <a:pPr algn="ctr"/>
+              <a:endParaRPr lang="en-PH" dirty="0">
+                <a:solidFill>
+                  <a:schemeClr val="tx1"/>
+                </a:solidFill>
+              </a:endParaRPr>
+            </a:p>
+          </p:txBody>
+        </p:sp>
+        <p:pic>
+          <p:nvPicPr>
+            <p:cNvPr id="7" name="Picture 2">
+              <a:extLst>
+                <a:ext uri="{FF2B5EF4-FFF2-40B4-BE49-F238E27FC236}">
+                  <a16:creationId xmlns:a16="http://schemas.microsoft.com/office/drawing/2014/main" id="{15405700-1BB8-901D-6969-EAB019F9ECFC}"/>
+                </a:ext>
+              </a:extLst>
+            </p:cNvPr>
+            <p:cNvPicPr>
+              <a:picLocks noChangeAspect="1" noChangeArrowheads="1"/>
+            </p:cNvPicPr>
+            <p:nvPr/>
+          </p:nvPicPr>
+          <p:blipFill>
+            <a:blip r:embed="rId2">
+              <a:extLst>
+                <a:ext uri="{28A0092B-C50C-407E-A947-70E740481C1C}">
+                  <a14:useLocalDpi xmlns:a14="http://schemas.microsoft.com/office/drawing/2010/main" val="0"/>
+                </a:ext>
+              </a:extLst>
+            </a:blip>
+            <a:srcRect/>
+            <a:stretch>
+              <a:fillRect/>
+            </a:stretch>
+          </p:blipFill>
+          <p:spPr bwMode="auto">
+            <a:xfrm>
+              <a:off x="2671187" y="2118731"/>
+              <a:ext cx="1087984" cy="843549"/>
+            </a:xfrm>
+            <a:prstGeom prst="rect">
+              <a:avLst/>
+            </a:prstGeom>
+            <a:noFill/>
+            <a:extLst>
+              <a:ext uri="{909E8E84-426E-40DD-AFC4-6F175D3DCCD1}">
+                <a14:hiddenFill xmlns:a14="http://schemas.microsoft.com/office/drawing/2010/main">
+                  <a:solidFill>
+                    <a:srgbClr val="FFFFFF"/>
+                  </a:solidFill>
+                </a14:hiddenFill>
+              </a:ext>
+            </a:extLst>
+          </p:spPr>
+        </p:pic>
+        <p:sp>
+          <p:nvSpPr>
+            <p:cNvPr id="9" name="Rectangle: Rounded Corners 8">
+              <a:extLst>
+                <a:ext uri="{FF2B5EF4-FFF2-40B4-BE49-F238E27FC236}">
+                  <a16:creationId xmlns:a16="http://schemas.microsoft.com/office/drawing/2014/main" id="{F549A47C-6FC1-A6B7-E086-9223382A3F13}"/>
+                </a:ext>
+              </a:extLst>
+            </p:cNvPr>
+            <p:cNvSpPr/>
+            <p:nvPr/>
+          </p:nvSpPr>
+          <p:spPr>
+            <a:xfrm>
+              <a:off x="3914111" y="2118731"/>
+              <a:ext cx="1729828" cy="457199"/>
+            </a:xfrm>
+            <a:prstGeom prst="roundRect">
+              <a:avLst/>
+            </a:prstGeom>
+            <a:noFill/>
+            <a:ln>
+              <a:noFill/>
+            </a:ln>
+          </p:spPr>
+          <p:style>
+            <a:lnRef idx="2">
+              <a:schemeClr val="accent1">
+                <a:shade val="50000"/>
+              </a:schemeClr>
+            </a:lnRef>
+            <a:fillRef idx="1">
+              <a:schemeClr val="accent1"/>
+            </a:fillRef>
+            <a:effectRef idx="0">
+              <a:schemeClr val="accent1"/>
+            </a:effectRef>
+            <a:fontRef idx="minor">
+              <a:schemeClr val="lt1"/>
+            </a:fontRef>
+          </p:style>
+          <p:txBody>
+            <a:bodyPr rtlCol="0" anchor="ctr"/>
+            <a:lstStyle/>
+            <a:p>
+              <a:pPr algn="ctr"/>
               <a:r>
                 <a:rPr lang="en-US" dirty="0">
                   <a:solidFill>
                     <a:schemeClr val="tx1"/>
                   </a:solidFill>
                 </a:rPr>
-                <a:t>Item</a:t>
+                <a:t>Item name</a:t>
               </a:r>
               <a:endParaRPr lang="en-PH" dirty="0">
                 <a:solidFill>
@@ -5419,10 +5704,10 @@
         </p:sp>
         <p:sp>
           <p:nvSpPr>
-            <p:cNvPr id="8" name="Rectangle: Rounded Corners 7">
+            <p:cNvPr id="10" name="Rectangle: Rounded Corners 9">
               <a:extLst>
                 <a:ext uri="{FF2B5EF4-FFF2-40B4-BE49-F238E27FC236}">
-                  <a16:creationId xmlns:a16="http://schemas.microsoft.com/office/drawing/2014/main" id="{22BBF5C1-B0A6-4DD1-6355-FB19864E58FF}"/>
+                  <a16:creationId xmlns:a16="http://schemas.microsoft.com/office/drawing/2014/main" id="{891CDD75-F44B-5ED7-54A6-463AEBB8C7A3}"/>
                 </a:ext>
               </a:extLst>
             </p:cNvPr>
@@ -5431,8 +5716,91 @@
           </p:nvSpPr>
           <p:spPr>
             <a:xfrm>
-              <a:off x="4198433" y="3025689"/>
-              <a:ext cx="1103971" cy="457199"/>
+              <a:off x="3914111" y="2668256"/>
+              <a:ext cx="1729828" cy="457199"/>
+            </a:xfrm>
+            <a:prstGeom prst="roundRect">
+              <a:avLst/>
+            </a:prstGeom>
+            <a:noFill/>
+            <a:ln>
+              <a:noFill/>
+            </a:ln>
+          </p:spPr>
+          <p:style>
+            <a:lnRef idx="2">
+              <a:schemeClr val="accent1">
+                <a:shade val="50000"/>
+              </a:schemeClr>
+            </a:lnRef>
+            <a:fillRef idx="1">
+              <a:schemeClr val="accent1"/>
+            </a:fillRef>
+            <a:effectRef idx="0">
+              <a:schemeClr val="accent1"/>
+            </a:effectRef>
+            <a:fontRef idx="minor">
+              <a:schemeClr val="lt1"/>
+            </a:fontRef>
+          </p:style>
+          <p:txBody>
+            <a:bodyPr rtlCol="0" anchor="ctr"/>
+            <a:lstStyle/>
+            <a:p>
+              <a:pPr algn="ctr"/>
+              <a:r>
+                <a:rPr lang="en-US" sz="1400" dirty="0">
+                  <a:solidFill>
+                    <a:schemeClr val="tx1"/>
+                  </a:solidFill>
+                </a:rPr>
+                <a:t>Item description</a:t>
+              </a:r>
+              <a:endParaRPr lang="en-PH" sz="1400" dirty="0">
+                <a:solidFill>
+                  <a:schemeClr val="tx1"/>
+                </a:solidFill>
+              </a:endParaRPr>
+            </a:p>
+          </p:txBody>
+        </p:sp>
+      </p:grpSp>
+      <p:grpSp>
+        <p:nvGrpSpPr>
+          <p:cNvPr id="11" name="Group 10">
+            <a:extLst>
+              <a:ext uri="{FF2B5EF4-FFF2-40B4-BE49-F238E27FC236}">
+                <a16:creationId xmlns:a16="http://schemas.microsoft.com/office/drawing/2014/main" id="{77C51A3F-E189-2082-E2F0-B324F1073DEC}"/>
+              </a:ext>
+            </a:extLst>
+          </p:cNvPr>
+          <p:cNvGrpSpPr/>
+          <p:nvPr/>
+        </p:nvGrpSpPr>
+        <p:grpSpPr>
+          <a:xfrm>
+            <a:off x="7874451" y="1843660"/>
+            <a:ext cx="3077737" cy="1189469"/>
+            <a:chOff x="2397512" y="1843660"/>
+            <a:chExt cx="3698488" cy="1461053"/>
+          </a:xfrm>
+        </p:grpSpPr>
+        <p:sp>
+          <p:nvSpPr>
+            <p:cNvPr id="12" name="Rectangle: Rounded Corners 11">
+              <a:extLst>
+                <a:ext uri="{FF2B5EF4-FFF2-40B4-BE49-F238E27FC236}">
+                  <a16:creationId xmlns:a16="http://schemas.microsoft.com/office/drawing/2014/main" id="{5DFF7F03-2D1D-BC46-77C3-EBD4BD63C44F}"/>
+                </a:ext>
+              </a:extLst>
+            </p:cNvPr>
+            <p:cNvSpPr/>
+            <p:nvPr/>
+          </p:nvSpPr>
+          <p:spPr>
+            <a:xfrm>
+              <a:off x="2397512" y="1843660"/>
+              <a:ext cx="3698488" cy="1461053"/>
             </a:xfrm>
             <a:prstGeom prst="roundRect">
               <a:avLst/>
@@ -5465,14 +5833,6 @@
             <a:lstStyle/>
             <a:p>
               <a:pPr algn="ctr"/>
-              <a:r>
-                <a:rPr lang="en-US" dirty="0">
-                  <a:solidFill>
-                    <a:schemeClr val="tx1"/>
-                  </a:solidFill>
-                </a:rPr>
-                <a:t>Item</a:t>
-              </a:r>
               <a:endParaRPr lang="en-PH" dirty="0">
                 <a:solidFill>
                   <a:schemeClr val="tx1"/>
@@ -5481,12 +5841,59 @@
             </a:p>
           </p:txBody>
         </p:sp>
+        <p:pic>
+          <p:nvPicPr>
+            <p:cNvPr id="13" name="Picture 2">
+              <a:extLst>
+                <a:ext uri="{FF2B5EF4-FFF2-40B4-BE49-F238E27FC236}">
+                  <a16:creationId xmlns:a16="http://schemas.microsoft.com/office/drawing/2014/main" id="{D392346E-FED6-E52A-D72A-755F4C7334F0}"/>
+                </a:ext>
+              </a:extLst>
+            </p:cNvPr>
+            <p:cNvPicPr>
+              <a:picLocks noChangeAspect="1" noChangeArrowheads="1"/>
+            </p:cNvPicPr>
+            <p:nvPr/>
+          </p:nvPicPr>
+          <p:blipFill>
+            <a:blip r:embed="rId2">
+              <a:extLst>
+                <a:ext uri="{28A0092B-C50C-407E-A947-70E740481C1C}">
+                  <a14:useLocalDpi xmlns:a14="http://schemas.microsoft.com/office/drawing/2010/main" val="0"/>
+                </a:ext>
+              </a:extLst>
+            </a:blip>
+            <a:srcRect/>
+            <a:stretch>
+              <a:fillRect/>
+            </a:stretch>
+          </p:blipFill>
+          <p:spPr bwMode="auto">
+            <a:xfrm>
+              <a:off x="2671187" y="2118731"/>
+              <a:ext cx="1087984" cy="843549"/>
+            </a:xfrm>
+            <a:prstGeom prst="rect">
+              <a:avLst/>
+            </a:prstGeom>
+            <a:noFill/>
+            <a:extLst>
+              <a:ext uri="{909E8E84-426E-40DD-AFC4-6F175D3DCCD1}">
+                <a14:hiddenFill xmlns:a14="http://schemas.microsoft.com/office/drawing/2010/main">
+                  <a:solidFill>
+                    <a:srgbClr val="FFFFFF"/>
+                  </a:solidFill>
+                </a14:hiddenFill>
+              </a:ext>
+            </a:extLst>
+          </p:spPr>
+        </p:pic>
         <p:sp>
           <p:nvSpPr>
-            <p:cNvPr id="9" name="Rectangle 8">
+            <p:cNvPr id="14" name="Rectangle: Rounded Corners 13">
               <a:extLst>
                 <a:ext uri="{FF2B5EF4-FFF2-40B4-BE49-F238E27FC236}">
-                  <a16:creationId xmlns:a16="http://schemas.microsoft.com/office/drawing/2014/main" id="{E4B594EB-C957-A537-34EC-DEC37851619B}"/>
+                  <a16:creationId xmlns:a16="http://schemas.microsoft.com/office/drawing/2014/main" id="{70A72B98-CD79-B253-E153-B3DE0DAB6BEA}"/>
                 </a:ext>
               </a:extLst>
             </p:cNvPr>
@@ -5495,17 +5902,15 @@
           </p:nvSpPr>
           <p:spPr>
             <a:xfrm>
-              <a:off x="2397512" y="3668737"/>
-              <a:ext cx="7396975" cy="457199"/>
+              <a:off x="3914111" y="2118731"/>
+              <a:ext cx="1729828" cy="457199"/>
             </a:xfrm>
-            <a:prstGeom prst="rect">
+            <a:prstGeom prst="roundRect">
               <a:avLst/>
             </a:prstGeom>
             <a:noFill/>
             <a:ln>
-              <a:solidFill>
-                <a:schemeClr val="tx1"/>
-              </a:solidFill>
+              <a:noFill/>
             </a:ln>
           </p:spPr>
           <p:style>
@@ -5535,7 +5940,7 @@
                     <a:schemeClr val="tx1"/>
                   </a:solidFill>
                 </a:rPr>
-                <a:t>Description</a:t>
+                <a:t>Item name</a:t>
               </a:r>
               <a:endParaRPr lang="en-PH" dirty="0">
                 <a:solidFill>
@@ -5547,10 +5952,10 @@
         </p:sp>
         <p:sp>
           <p:nvSpPr>
-            <p:cNvPr id="10" name="Rectangle: Rounded Corners 9">
+            <p:cNvPr id="15" name="Rectangle: Rounded Corners 14">
               <a:extLst>
                 <a:ext uri="{FF2B5EF4-FFF2-40B4-BE49-F238E27FC236}">
-                  <a16:creationId xmlns:a16="http://schemas.microsoft.com/office/drawing/2014/main" id="{B425DD4D-F1B3-9168-69C3-DC43C25E2038}"/>
+                  <a16:creationId xmlns:a16="http://schemas.microsoft.com/office/drawing/2014/main" id="{331F3968-ED8C-7156-9EB5-715C52D3DBCA}"/>
                 </a:ext>
               </a:extLst>
             </p:cNvPr>
@@ -5559,17 +5964,15 @@
           </p:nvSpPr>
           <p:spPr>
             <a:xfrm>
-              <a:off x="4908393" y="4311785"/>
-              <a:ext cx="1103971" cy="457199"/>
+              <a:off x="3914111" y="2668256"/>
+              <a:ext cx="1729828" cy="457199"/>
             </a:xfrm>
             <a:prstGeom prst="roundRect">
               <a:avLst/>
             </a:prstGeom>
             <a:noFill/>
             <a:ln>
-              <a:solidFill>
-                <a:schemeClr val="tx1"/>
-              </a:solidFill>
+              <a:noFill/>
             </a:ln>
           </p:spPr>
           <p:style>
@@ -5594,206 +5997,14 @@
             <a:p>
               <a:pPr algn="ctr"/>
               <a:r>
-                <a:rPr lang="en-US" dirty="0">
+                <a:rPr lang="en-US" sz="1400" dirty="0">
                   <a:solidFill>
                     <a:schemeClr val="tx1"/>
                   </a:solidFill>
                 </a:rPr>
-                <a:t>Item</a:t>
+                <a:t>Item description</a:t>
               </a:r>
-              <a:endParaRPr lang="en-PH" dirty="0">
-                <a:solidFill>
-                  <a:schemeClr val="tx1"/>
-                </a:solidFill>
-              </a:endParaRPr>
-            </a:p>
-          </p:txBody>
-        </p:sp>
-        <p:sp>
-          <p:nvSpPr>
-            <p:cNvPr id="11" name="Rectangle: Rounded Corners 10">
-              <a:extLst>
-                <a:ext uri="{FF2B5EF4-FFF2-40B4-BE49-F238E27FC236}">
-                  <a16:creationId xmlns:a16="http://schemas.microsoft.com/office/drawing/2014/main" id="{232E1270-69CB-2F7B-C443-7FAC0244AD49}"/>
-                </a:ext>
-              </a:extLst>
-            </p:cNvPr>
-            <p:cNvSpPr/>
-            <p:nvPr/>
-          </p:nvSpPr>
-          <p:spPr>
-            <a:xfrm>
-              <a:off x="6253973" y="4311785"/>
-              <a:ext cx="1103971" cy="457199"/>
-            </a:xfrm>
-            <a:prstGeom prst="roundRect">
-              <a:avLst/>
-            </a:prstGeom>
-            <a:noFill/>
-            <a:ln>
-              <a:solidFill>
-                <a:schemeClr val="tx1"/>
-              </a:solidFill>
-            </a:ln>
-          </p:spPr>
-          <p:style>
-            <a:lnRef idx="2">
-              <a:schemeClr val="accent1">
-                <a:shade val="50000"/>
-              </a:schemeClr>
-            </a:lnRef>
-            <a:fillRef idx="1">
-              <a:schemeClr val="accent1"/>
-            </a:fillRef>
-            <a:effectRef idx="0">
-              <a:schemeClr val="accent1"/>
-            </a:effectRef>
-            <a:fontRef idx="minor">
-              <a:schemeClr val="lt1"/>
-            </a:fontRef>
-          </p:style>
-          <p:txBody>
-            <a:bodyPr rtlCol="0" anchor="ctr"/>
-            <a:lstStyle/>
-            <a:p>
-              <a:pPr algn="ctr"/>
-              <a:r>
-                <a:rPr lang="en-US" dirty="0">
-                  <a:solidFill>
-                    <a:schemeClr val="tx1"/>
-                  </a:solidFill>
-                </a:rPr>
-                <a:t>Item</a:t>
-              </a:r>
-              <a:endParaRPr lang="en-PH" dirty="0">
-                <a:solidFill>
-                  <a:schemeClr val="tx1"/>
-                </a:solidFill>
-              </a:endParaRPr>
-            </a:p>
-          </p:txBody>
-        </p:sp>
-        <p:sp>
-          <p:nvSpPr>
-            <p:cNvPr id="12" name="Rectangle: Rounded Corners 11">
-              <a:extLst>
-                <a:ext uri="{FF2B5EF4-FFF2-40B4-BE49-F238E27FC236}">
-                  <a16:creationId xmlns:a16="http://schemas.microsoft.com/office/drawing/2014/main" id="{AACE96A0-A850-B626-75E5-03CC63A11BC0}"/>
-                </a:ext>
-              </a:extLst>
-            </p:cNvPr>
-            <p:cNvSpPr/>
-            <p:nvPr/>
-          </p:nvSpPr>
-          <p:spPr>
-            <a:xfrm>
-              <a:off x="3562813" y="4311785"/>
-              <a:ext cx="1103971" cy="457199"/>
-            </a:xfrm>
-            <a:prstGeom prst="roundRect">
-              <a:avLst/>
-            </a:prstGeom>
-            <a:noFill/>
-            <a:ln>
-              <a:solidFill>
-                <a:schemeClr val="tx1"/>
-              </a:solidFill>
-            </a:ln>
-          </p:spPr>
-          <p:style>
-            <a:lnRef idx="2">
-              <a:schemeClr val="accent1">
-                <a:shade val="50000"/>
-              </a:schemeClr>
-            </a:lnRef>
-            <a:fillRef idx="1">
-              <a:schemeClr val="accent1"/>
-            </a:fillRef>
-            <a:effectRef idx="0">
-              <a:schemeClr val="accent1"/>
-            </a:effectRef>
-            <a:fontRef idx="minor">
-              <a:schemeClr val="lt1"/>
-            </a:fontRef>
-          </p:style>
-          <p:txBody>
-            <a:bodyPr rtlCol="0" anchor="ctr"/>
-            <a:lstStyle/>
-            <a:p>
-              <a:pPr algn="ctr"/>
-              <a:r>
-                <a:rPr lang="en-US" dirty="0">
-                  <a:solidFill>
-                    <a:schemeClr val="tx1"/>
-                  </a:solidFill>
-                </a:rPr>
-                <a:t>Item</a:t>
-              </a:r>
-              <a:endParaRPr lang="en-PH" dirty="0">
-                <a:solidFill>
-                  <a:schemeClr val="tx1"/>
-                </a:solidFill>
-              </a:endParaRPr>
-            </a:p>
-          </p:txBody>
-        </p:sp>
-        <p:sp>
-          <p:nvSpPr>
-            <p:cNvPr id="13" name="Rectangle: Rounded Corners 12">
-              <a:extLst>
-                <a:ext uri="{FF2B5EF4-FFF2-40B4-BE49-F238E27FC236}">
-                  <a16:creationId xmlns:a16="http://schemas.microsoft.com/office/drawing/2014/main" id="{6EAB841F-8A62-F6DC-48AB-3742650CDD2F}"/>
-                </a:ext>
-              </a:extLst>
-            </p:cNvPr>
-            <p:cNvSpPr/>
-            <p:nvPr/>
-          </p:nvSpPr>
-          <p:spPr>
-            <a:xfrm>
-              <a:off x="7599553" y="4337779"/>
-              <a:ext cx="1103971" cy="457199"/>
-            </a:xfrm>
-            <a:prstGeom prst="roundRect">
-              <a:avLst/>
-            </a:prstGeom>
-            <a:noFill/>
-            <a:ln>
-              <a:solidFill>
-                <a:schemeClr val="tx1"/>
-              </a:solidFill>
-            </a:ln>
-          </p:spPr>
-          <p:style>
-            <a:lnRef idx="2">
-              <a:schemeClr val="accent1">
-                <a:shade val="50000"/>
-              </a:schemeClr>
-            </a:lnRef>
-            <a:fillRef idx="1">
-              <a:schemeClr val="accent1"/>
-            </a:fillRef>
-            <a:effectRef idx="0">
-              <a:schemeClr val="accent1"/>
-            </a:effectRef>
-            <a:fontRef idx="minor">
-              <a:schemeClr val="lt1"/>
-            </a:fontRef>
-          </p:style>
-          <p:txBody>
-            <a:bodyPr rtlCol="0" anchor="ctr"/>
-            <a:lstStyle/>
-            <a:p>
-              <a:pPr algn="ctr"/>
-              <a:r>
-                <a:rPr lang="en-US" dirty="0">
-                  <a:solidFill>
-                    <a:schemeClr val="tx1"/>
-                  </a:solidFill>
-                </a:rPr>
-                <a:t>Item</a:t>
-              </a:r>
-              <a:endParaRPr lang="en-PH" dirty="0">
+              <a:endParaRPr lang="en-PH" sz="1400" dirty="0">
                 <a:solidFill>
                   <a:schemeClr val="tx1"/>
                 </a:solidFill>

</xml_diff>